<commit_message>
Add Phone to poster
</commit_message>
<xml_diff>
--- a/poster.pptx
+++ b/poster.pptx
@@ -259,7 +259,7 @@
   </p:defaultTextStyle>
   <p:extLst>
     <p:ext uri="http://customooxmlschemas.google.com/">
-      <go:slidesCustomData xmlns:go="http://customooxmlschemas.google.com/" xmlns:ahyp="http://schemas.microsoft.com/office/drawing/2018/hyperlinkcolor" xmlns:p15="http://schemas.microsoft.com/office/powerpoint/2012/main" xmlns:p14="http://schemas.microsoft.com/office/powerpoint/2010/main" xmlns:com="http://schemas.openxmlformats.org/drawingml/2006/compatibility" xmlns:pvml="urn:schemas-microsoft-com:office:powerpoint" xmlns:v="urn:schemas-microsoft-com:vml" xmlns:o="urn:schemas-microsoft-com:office:office" xmlns:dgm="http://schemas.openxmlformats.org/drawingml/2006/diagram" xmlns:c="http://schemas.openxmlformats.org/drawingml/2006/chart" xmlns:mv="urn:schemas-microsoft-com:mac:vml" xmlns:mc="http://schemas.openxmlformats.org/markup-compatibility/2006" xmlns="" r:id="rId12" roundtripDataSignature="AMtx7miRtlYHKgFEa4BkHzJosnFryE2YHQ=="/>
+      <go:slidesCustomData xmlns="" xmlns:mc="http://schemas.openxmlformats.org/markup-compatibility/2006" xmlns:mv="urn:schemas-microsoft-com:mac:vml" xmlns:c="http://schemas.openxmlformats.org/drawingml/2006/chart" xmlns:dgm="http://schemas.openxmlformats.org/drawingml/2006/diagram" xmlns:o="urn:schemas-microsoft-com:office:office" xmlns:v="urn:schemas-microsoft-com:vml" xmlns:pvml="urn:schemas-microsoft-com:office:powerpoint" xmlns:com="http://schemas.openxmlformats.org/drawingml/2006/compatibility" xmlns:p14="http://schemas.microsoft.com/office/powerpoint/2010/main" xmlns:p15="http://schemas.microsoft.com/office/powerpoint/2012/main" xmlns:ahyp="http://schemas.microsoft.com/office/drawing/2018/hyperlinkcolor" xmlns:go="http://customooxmlschemas.google.com/" r:id="rId12" roundtripDataSignature="AMtx7miRtlYHKgFEa4BkHzJosnFryE2YHQ=="/>
     </p:ext>
   </p:extLst>
 </p:presentation>
@@ -11953,7 +11953,7 @@
         </p:blipFill>
         <p:spPr>
           <a:xfrm>
-            <a:off x="0" y="4012619"/>
+            <a:off x="-28139826" y="3286034"/>
             <a:ext cx="14238565" cy="24841953"/>
           </a:xfrm>
           <a:prstGeom prst="rect">
@@ -12035,6 +12035,36 @@
           <a:ln>
             <a:noFill/>
           </a:ln>
+        </p:spPr>
+      </p:pic>
+      <p:pic>
+        <p:nvPicPr>
+          <p:cNvPr id="3" name="Picture 2">
+            <a:extLst>
+              <a:ext uri="{FF2B5EF4-FFF2-40B4-BE49-F238E27FC236}">
+                <a16:creationId xmlns:a16="http://schemas.microsoft.com/office/drawing/2014/main" id="{24970E06-4D9A-4CCC-9878-C248CAB5116A}"/>
+              </a:ext>
+            </a:extLst>
+          </p:cNvPr>
+          <p:cNvPicPr>
+            <a:picLocks noChangeAspect="1"/>
+          </p:cNvPicPr>
+          <p:nvPr/>
+        </p:nvPicPr>
+        <p:blipFill>
+          <a:blip r:embed="rId7"/>
+          <a:stretch>
+            <a:fillRect/>
+          </a:stretch>
+        </p:blipFill>
+        <p:spPr>
+          <a:xfrm>
+            <a:off x="210421" y="4313600"/>
+            <a:ext cx="12905151" cy="23944179"/>
+          </a:xfrm>
+          <a:prstGeom prst="rect">
+            <a:avLst/>
+          </a:prstGeom>
         </p:spPr>
       </p:pic>
     </p:spTree>

</xml_diff>